<commit_message>
Update Capstone_Three_Final_Presentation (Shahjahan Ahmed).pptx
</commit_message>
<xml_diff>
--- a/Capstone_Three_Final_Presentation (Shahjahan Ahmed).pptx
+++ b/Capstone_Three_Final_Presentation (Shahjahan Ahmed).pptx
@@ -284,7 +284,7 @@
           <a:p>
             <a:fld id="{F0BC8984-827A-478A-9D5F-BEAAD85FC1D3}" type="datetimeFigureOut">
               <a:rPr lang="en-US" smtClean="0"/>
-              <a:t>1/12/2022</a:t>
+              <a:t>1/15/2022</a:t>
             </a:fld>
             <a:endParaRPr lang="en-US"/>
           </a:p>
@@ -482,7 +482,7 @@
           <a:p>
             <a:fld id="{F0BC8984-827A-478A-9D5F-BEAAD85FC1D3}" type="datetimeFigureOut">
               <a:rPr lang="en-US" smtClean="0"/>
-              <a:t>1/12/2022</a:t>
+              <a:t>1/15/2022</a:t>
             </a:fld>
             <a:endParaRPr lang="en-US"/>
           </a:p>
@@ -690,7 +690,7 @@
           <a:p>
             <a:fld id="{F0BC8984-827A-478A-9D5F-BEAAD85FC1D3}" type="datetimeFigureOut">
               <a:rPr lang="en-US" smtClean="0"/>
-              <a:t>1/12/2022</a:t>
+              <a:t>1/15/2022</a:t>
             </a:fld>
             <a:endParaRPr lang="en-US"/>
           </a:p>
@@ -888,7 +888,7 @@
           <a:p>
             <a:fld id="{F0BC8984-827A-478A-9D5F-BEAAD85FC1D3}" type="datetimeFigureOut">
               <a:rPr lang="en-US" smtClean="0"/>
-              <a:t>1/12/2022</a:t>
+              <a:t>1/15/2022</a:t>
             </a:fld>
             <a:endParaRPr lang="en-US"/>
           </a:p>
@@ -1163,7 +1163,7 @@
           <a:p>
             <a:fld id="{F0BC8984-827A-478A-9D5F-BEAAD85FC1D3}" type="datetimeFigureOut">
               <a:rPr lang="en-US" smtClean="0"/>
-              <a:t>1/12/2022</a:t>
+              <a:t>1/15/2022</a:t>
             </a:fld>
             <a:endParaRPr lang="en-US"/>
           </a:p>
@@ -1428,7 +1428,7 @@
           <a:p>
             <a:fld id="{F0BC8984-827A-478A-9D5F-BEAAD85FC1D3}" type="datetimeFigureOut">
               <a:rPr lang="en-US" smtClean="0"/>
-              <a:t>1/12/2022</a:t>
+              <a:t>1/15/2022</a:t>
             </a:fld>
             <a:endParaRPr lang="en-US"/>
           </a:p>
@@ -1840,7 +1840,7 @@
           <a:p>
             <a:fld id="{F0BC8984-827A-478A-9D5F-BEAAD85FC1D3}" type="datetimeFigureOut">
               <a:rPr lang="en-US" smtClean="0"/>
-              <a:t>1/12/2022</a:t>
+              <a:t>1/15/2022</a:t>
             </a:fld>
             <a:endParaRPr lang="en-US"/>
           </a:p>
@@ -1981,7 +1981,7 @@
           <a:p>
             <a:fld id="{F0BC8984-827A-478A-9D5F-BEAAD85FC1D3}" type="datetimeFigureOut">
               <a:rPr lang="en-US" smtClean="0"/>
-              <a:t>1/12/2022</a:t>
+              <a:t>1/15/2022</a:t>
             </a:fld>
             <a:endParaRPr lang="en-US"/>
           </a:p>
@@ -2094,7 +2094,7 @@
           <a:p>
             <a:fld id="{F0BC8984-827A-478A-9D5F-BEAAD85FC1D3}" type="datetimeFigureOut">
               <a:rPr lang="en-US" smtClean="0"/>
-              <a:t>1/12/2022</a:t>
+              <a:t>1/15/2022</a:t>
             </a:fld>
             <a:endParaRPr lang="en-US"/>
           </a:p>
@@ -2405,7 +2405,7 @@
           <a:p>
             <a:fld id="{F0BC8984-827A-478A-9D5F-BEAAD85FC1D3}" type="datetimeFigureOut">
               <a:rPr lang="en-US" smtClean="0"/>
-              <a:t>1/12/2022</a:t>
+              <a:t>1/15/2022</a:t>
             </a:fld>
             <a:endParaRPr lang="en-US"/>
           </a:p>
@@ -2693,7 +2693,7 @@
           <a:p>
             <a:fld id="{F0BC8984-827A-478A-9D5F-BEAAD85FC1D3}" type="datetimeFigureOut">
               <a:rPr lang="en-US" smtClean="0"/>
-              <a:t>1/12/2022</a:t>
+              <a:t>1/15/2022</a:t>
             </a:fld>
             <a:endParaRPr lang="en-US"/>
           </a:p>
@@ -2934,7 +2934,7 @@
           <a:p>
             <a:fld id="{F0BC8984-827A-478A-9D5F-BEAAD85FC1D3}" type="datetimeFigureOut">
               <a:rPr lang="en-US" smtClean="0"/>
-              <a:t>1/12/2022</a:t>
+              <a:t>1/15/2022</a:t>
             </a:fld>
             <a:endParaRPr lang="en-US"/>
           </a:p>
@@ -5656,7 +5656,6 @@
             <a:r>
               <a:rPr lang="en-US" sz="2200" dirty="0">
                 <a:effectLst/>
-                <a:latin typeface="Arial" panose="020B0604020202020204" pitchFamily="34" charset="0"/>
                 <a:ea typeface="Times New Roman" panose="02020603050405020304" pitchFamily="18" charset="0"/>
               </a:rPr>
               <a:t> Implement different Neural Network Architectures for Brain Tumor Classification and Prediction</a:t>
@@ -5669,7 +5668,6 @@
             </a:pPr>
             <a:r>
               <a:rPr lang="en-US" sz="2200" dirty="0">
-                <a:latin typeface="Arial" panose="020B0604020202020204" pitchFamily="34" charset="0"/>
                 <a:ea typeface="Times New Roman" panose="02020603050405020304" pitchFamily="18" charset="0"/>
               </a:rPr>
               <a:t> Set up appropriate hyperparameters for each model</a:t>
@@ -5683,21 +5681,18 @@
             <a:r>
               <a:rPr lang="en-US" sz="2200" dirty="0">
                 <a:effectLst/>
-                <a:latin typeface="Arial" panose="020B0604020202020204" pitchFamily="34" charset="0"/>
                 <a:ea typeface="Times New Roman" panose="02020603050405020304" pitchFamily="18" charset="0"/>
               </a:rPr>
               <a:t> Compile </a:t>
             </a:r>
             <a:r>
               <a:rPr lang="en-US" sz="2200" dirty="0">
-                <a:latin typeface="Arial" panose="020B0604020202020204" pitchFamily="34" charset="0"/>
                 <a:ea typeface="Times New Roman" panose="02020603050405020304" pitchFamily="18" charset="0"/>
               </a:rPr>
               <a:t>each model using appropriate optimizer, loss function, and model metrics</a:t>
             </a:r>
             <a:endParaRPr lang="en-US" sz="2200" dirty="0">
               <a:effectLst/>
-              <a:latin typeface="Arial" panose="020B0604020202020204" pitchFamily="34" charset="0"/>
               <a:ea typeface="Times New Roman" panose="02020603050405020304" pitchFamily="18" charset="0"/>
             </a:endParaRPr>
           </a:p>
@@ -5708,7 +5703,6 @@
             </a:pPr>
             <a:r>
               <a:rPr lang="en-US" sz="2200" dirty="0">
-                <a:latin typeface="Arial" panose="020B0604020202020204" pitchFamily="34" charset="0"/>
                 <a:ea typeface="Times New Roman" panose="02020603050405020304" pitchFamily="18" charset="0"/>
               </a:rPr>
               <a:t> Train each model using training set and predict the model’s performance using test set</a:t>
@@ -5722,7 +5716,6 @@
             <a:r>
               <a:rPr lang="en-US" sz="2200" dirty="0">
                 <a:effectLst/>
-                <a:latin typeface="Arial" panose="020B0604020202020204" pitchFamily="34" charset="0"/>
                 <a:ea typeface="Times New Roman" panose="02020603050405020304" pitchFamily="18" charset="0"/>
               </a:rPr>
               <a:t> Evaluate test results of each model using evaluation metrics</a:t>
@@ -5735,14 +5728,12 @@
             </a:pPr>
             <a:r>
               <a:rPr lang="en-US" sz="2200" dirty="0">
-                <a:latin typeface="Arial" panose="020B0604020202020204" pitchFamily="34" charset="0"/>
                 <a:ea typeface="Times New Roman" panose="02020603050405020304" pitchFamily="18" charset="0"/>
               </a:rPr>
               <a:t> Compare and find the best model</a:t>
             </a:r>
             <a:endParaRPr lang="en-US" sz="2200" dirty="0">
               <a:effectLst/>
-              <a:latin typeface="Arial" panose="020B0604020202020204" pitchFamily="34" charset="0"/>
               <a:ea typeface="Times New Roman" panose="02020603050405020304" pitchFamily="18" charset="0"/>
             </a:endParaRPr>
           </a:p>
@@ -5976,7 +5967,6 @@
             <a:r>
               <a:rPr lang="en-US" sz="3000" dirty="0">
                 <a:effectLst/>
-                <a:latin typeface="Arial" panose="020B0604020202020204" pitchFamily="34" charset="0"/>
                 <a:ea typeface="Times New Roman" panose="02020603050405020304" pitchFamily="18" charset="0"/>
               </a:rPr>
               <a:t>Model 1: Simple neural network with only dense layers</a:t>
@@ -6146,7 +6136,7 @@
         </p:spPr>
         <p:txBody>
           <a:bodyPr numCol="2" anchor="ctr">
-            <a:normAutofit/>
+            <a:normAutofit fontScale="92500" lnSpcReduction="10000"/>
           </a:bodyPr>
           <a:lstStyle/>
           <a:p>
@@ -6155,7 +6145,7 @@
               <a:buChar char="q"/>
             </a:pPr>
             <a:r>
-              <a:rPr lang="en-US" sz="1400"/>
+              <a:rPr lang="en-US" sz="1400" dirty="0"/>
               <a:t> The model 1 contains an input layer, six Dense layers, and one output layer. </a:t>
             </a:r>
           </a:p>
@@ -6165,8 +6155,24 @@
               <a:buChar char="q"/>
             </a:pPr>
             <a:r>
-              <a:rPr lang="en-US" sz="1400"/>
-              <a:t> I have used ‘ReLU’ as an activation function for the Dense layers and ‘softmax’ as an activation function for the output layer</a:t>
+              <a:rPr lang="en-US" sz="1400" dirty="0"/>
+              <a:t> I have used ‘</a:t>
+            </a:r>
+            <a:r>
+              <a:rPr lang="en-US" sz="1400" dirty="0" err="1"/>
+              <a:t>ReLU</a:t>
+            </a:r>
+            <a:r>
+              <a:rPr lang="en-US" sz="1400" dirty="0"/>
+              <a:t>’ as an activation function for the Dense layers and ‘</a:t>
+            </a:r>
+            <a:r>
+              <a:rPr lang="en-US" sz="1400" dirty="0" err="1"/>
+              <a:t>softmax</a:t>
+            </a:r>
+            <a:r>
+              <a:rPr lang="en-US" sz="1400" dirty="0"/>
+              <a:t>’ as an activation function for the output layer</a:t>
             </a:r>
           </a:p>
           <a:p>
@@ -6175,7 +6181,7 @@
               <a:buChar char="q"/>
             </a:pPr>
             <a:r>
-              <a:rPr lang="en-US" sz="1400"/>
+              <a:rPr lang="en-US" sz="1400" dirty="0"/>
               <a:t> I have defined Adam as an optimizer, categorical accuracy as a loss function, categorical cross entropy as a model metric.</a:t>
             </a:r>
           </a:p>
@@ -6185,9 +6191,31 @@
               <a:buChar char="q"/>
             </a:pPr>
             <a:r>
-              <a:rPr lang="en-US" sz="1400"/>
-              <a:t> No Regularization technique used.</a:t>
-            </a:r>
+              <a:rPr lang="en-US" sz="1400" dirty="0"/>
+              <a:t> No Regularization techniques used.</a:t>
+            </a:r>
+          </a:p>
+          <a:p>
+            <a:pPr>
+              <a:buFont typeface="Wingdings" panose="05000000000000000000" pitchFamily="2" charset="2"/>
+              <a:buChar char="q"/>
+            </a:pPr>
+            <a:r>
+              <a:rPr lang="en-US" sz="1400" dirty="0">
+                <a:effectLst/>
+                <a:ea typeface="Times New Roman" panose="02020603050405020304" pitchFamily="18" charset="0"/>
+                <a:cs typeface="Times New Roman" panose="02020603050405020304" pitchFamily="18" charset="0"/>
+              </a:rPr>
+              <a:t>Did not find the comple</a:t>
+            </a:r>
+            <a:r>
+              <a:rPr lang="en-US" sz="1400" dirty="0">
+                <a:ea typeface="Times New Roman" panose="02020603050405020304" pitchFamily="18" charset="0"/>
+                <a:cs typeface="Times New Roman" panose="02020603050405020304" pitchFamily="18" charset="0"/>
+              </a:rPr>
+              <a:t>x pattern in the data. There was not training and validation progress at certain epochs/steps. Need to implement complex models.</a:t>
+            </a:r>
+            <a:endParaRPr lang="en-US" sz="1400" dirty="0"/>
           </a:p>
         </p:txBody>
       </p:sp>
@@ -6353,14 +6381,13 @@
           <a:lstStyle/>
           <a:p>
             <a:r>
-              <a:rPr lang="en-US" sz="3000">
+              <a:rPr lang="en-US" sz="3000" dirty="0">
                 <a:effectLst/>
-                <a:latin typeface="Arial" panose="020B0604020202020204" pitchFamily="34" charset="0"/>
                 <a:ea typeface="Times New Roman" panose="02020603050405020304" pitchFamily="18" charset="0"/>
               </a:rPr>
               <a:t>Evaluation Results for Model 1</a:t>
             </a:r>
-            <a:endParaRPr lang="en-US" sz="3000"/>
+            <a:endParaRPr lang="en-US" sz="3000" dirty="0"/>
           </a:p>
         </p:txBody>
       </p:sp>
@@ -6938,14 +6965,13 @@
           <a:lstStyle/>
           <a:p>
             <a:r>
-              <a:rPr lang="en-US" sz="2500">
+              <a:rPr lang="en-US" sz="2500" dirty="0">
                 <a:effectLst/>
-                <a:latin typeface="Arial" panose="020B0604020202020204" pitchFamily="34" charset="0"/>
                 <a:ea typeface="Times New Roman" panose="02020603050405020304" pitchFamily="18" charset="0"/>
               </a:rPr>
               <a:t>Model 2: Convolutional neural network with two Conv2D layers</a:t>
             </a:r>
-            <a:endParaRPr lang="en-US" sz="2500"/>
+            <a:endParaRPr lang="en-US" sz="2500" dirty="0"/>
           </a:p>
         </p:txBody>
       </p:sp>
@@ -7134,7 +7160,7 @@
         </p:spPr>
         <p:txBody>
           <a:bodyPr numCol="2" anchor="ctr">
-            <a:normAutofit/>
+            <a:normAutofit lnSpcReduction="10000"/>
           </a:bodyPr>
           <a:lstStyle/>
           <a:p>
@@ -7143,7 +7169,7 @@
               <a:buChar char="q"/>
             </a:pPr>
             <a:r>
-              <a:rPr lang="en-US" sz="1300"/>
+              <a:rPr lang="en-US" sz="1300" dirty="0"/>
               <a:t>Model 2 contains an input layer, two Conv2D layers with MaxPolling2D layer, one Dense layer, and an output layer. </a:t>
             </a:r>
           </a:p>
@@ -7153,8 +7179,24 @@
               <a:buChar char="q"/>
             </a:pPr>
             <a:r>
-              <a:rPr lang="en-US" sz="1300"/>
-              <a:t> I have used ‘ReLU’ as an activation function for the hidden layers and ‘softmax’ as an activation function for the output layer</a:t>
+              <a:rPr lang="en-US" sz="1300" dirty="0"/>
+              <a:t> I have used ‘</a:t>
+            </a:r>
+            <a:r>
+              <a:rPr lang="en-US" sz="1300" dirty="0" err="1"/>
+              <a:t>ReLU</a:t>
+            </a:r>
+            <a:r>
+              <a:rPr lang="en-US" sz="1300" dirty="0"/>
+              <a:t>’ as an activation function for the hidden layers and ‘</a:t>
+            </a:r>
+            <a:r>
+              <a:rPr lang="en-US" sz="1300" dirty="0" err="1"/>
+              <a:t>softmax</a:t>
+            </a:r>
+            <a:r>
+              <a:rPr lang="en-US" sz="1300" dirty="0"/>
+              <a:t>’ as an activation function for the output layer</a:t>
             </a:r>
           </a:p>
           <a:p>
@@ -7163,7 +7205,7 @@
               <a:buChar char="q"/>
             </a:pPr>
             <a:r>
-              <a:rPr lang="en-US" sz="1300"/>
+              <a:rPr lang="en-US" sz="1300" dirty="0"/>
               <a:t> I have defined Adam as an optimizer, categorical accuracy as a loss function, categorical cross entropy as a model metric.</a:t>
             </a:r>
           </a:p>
@@ -7173,9 +7215,24 @@
               <a:buChar char="q"/>
             </a:pPr>
             <a:r>
-              <a:rPr lang="en-US" sz="1300"/>
+              <a:rPr lang="en-US" sz="1300" dirty="0"/>
               <a:t> No Regularization technique used.</a:t>
             </a:r>
+          </a:p>
+          <a:p>
+            <a:pPr>
+              <a:buFont typeface="Wingdings" panose="05000000000000000000" pitchFamily="2" charset="2"/>
+              <a:buChar char="q"/>
+            </a:pPr>
+            <a:r>
+              <a:rPr lang="en-US" sz="1400" dirty="0">
+                <a:effectLst/>
+                <a:ea typeface="Times New Roman" panose="02020603050405020304" pitchFamily="18" charset="0"/>
+                <a:cs typeface="Times New Roman" panose="02020603050405020304" pitchFamily="18" charset="0"/>
+              </a:rPr>
+              <a:t>Did not generalize well due to overfitting.</a:t>
+            </a:r>
+            <a:endParaRPr lang="en-US" sz="1300" dirty="0"/>
           </a:p>
         </p:txBody>
       </p:sp>
@@ -7341,14 +7398,13 @@
           <a:lstStyle/>
           <a:p>
             <a:r>
-              <a:rPr lang="en-US" sz="3000">
+              <a:rPr lang="en-US" sz="3000" dirty="0">
                 <a:effectLst/>
-                <a:latin typeface="Arial" panose="020B0604020202020204" pitchFamily="34" charset="0"/>
                 <a:ea typeface="Times New Roman" panose="02020603050405020304" pitchFamily="18" charset="0"/>
               </a:rPr>
               <a:t>Evaluation Results for Model 2</a:t>
             </a:r>
-            <a:endParaRPr lang="en-US" sz="3000"/>
+            <a:endParaRPr lang="en-US" sz="3000" dirty="0"/>
           </a:p>
         </p:txBody>
       </p:sp>
@@ -7926,14 +7982,13 @@
           <a:lstStyle/>
           <a:p>
             <a:r>
-              <a:rPr lang="en-US" sz="2000">
+              <a:rPr lang="en-US" sz="2000" dirty="0">
                 <a:effectLst/>
-                <a:latin typeface="Arial" panose="020B0604020202020204" pitchFamily="34" charset="0"/>
                 <a:ea typeface="Times New Roman" panose="02020603050405020304" pitchFamily="18" charset="0"/>
               </a:rPr>
               <a:t>Model 3: Convolutional neural network with two Conv2D layers and an  addition of regularization layers</a:t>
             </a:r>
-            <a:endParaRPr lang="en-US" sz="2000"/>
+            <a:endParaRPr lang="en-US" sz="2000" dirty="0"/>
           </a:p>
         </p:txBody>
       </p:sp>
@@ -8122,7 +8177,7 @@
         </p:spPr>
         <p:txBody>
           <a:bodyPr numCol="2" anchor="ctr">
-            <a:normAutofit/>
+            <a:noAutofit/>
           </a:bodyPr>
           <a:lstStyle/>
           <a:p>
@@ -8131,7 +8186,7 @@
               <a:buChar char="q"/>
             </a:pPr>
             <a:r>
-              <a:rPr lang="en-US" sz="1500"/>
+              <a:rPr lang="en-US" sz="1500" dirty="0"/>
               <a:t>Model 3 is a copy of model 2 with some additional regularization techniques. </a:t>
             </a:r>
           </a:p>
@@ -8141,7 +8196,7 @@
               <a:buChar char="q"/>
             </a:pPr>
             <a:r>
-              <a:rPr lang="en-US" sz="1500"/>
+              <a:rPr lang="en-US" sz="1500" dirty="0"/>
               <a:t>To overcome the overfitting caused by model 2, I have added BatchNorm2D layer after each convolutional layers and a Dropout layer after the dense layer. </a:t>
             </a:r>
           </a:p>
@@ -8151,9 +8206,24 @@
               <a:buChar char="q"/>
             </a:pPr>
             <a:r>
-              <a:rPr lang="en-US" sz="1500"/>
+              <a:rPr lang="en-US" sz="1500" dirty="0"/>
               <a:t> The optimizer, loss function, model metrics have kept same with previous model.</a:t>
             </a:r>
+          </a:p>
+          <a:p>
+            <a:pPr>
+              <a:buFont typeface="Wingdings" panose="05000000000000000000" pitchFamily="2" charset="2"/>
+              <a:buChar char="q"/>
+            </a:pPr>
+            <a:r>
+              <a:rPr lang="en-US" sz="1500" dirty="0">
+                <a:effectLst/>
+                <a:ea typeface="Times New Roman" panose="02020603050405020304" pitchFamily="18" charset="0"/>
+                <a:cs typeface="Times New Roman" panose="02020603050405020304" pitchFamily="18" charset="0"/>
+              </a:rPr>
+              <a:t>Still contain overfitting and did not capture the complex patters in the data due to model’s capacity.</a:t>
+            </a:r>
+            <a:endParaRPr lang="en-US" sz="1500" dirty="0"/>
           </a:p>
         </p:txBody>
       </p:sp>
@@ -8321,7 +8391,6 @@
             <a:r>
               <a:rPr lang="en-US" sz="3000" dirty="0">
                 <a:effectLst/>
-                <a:latin typeface="Arial" panose="020B0604020202020204" pitchFamily="34" charset="0"/>
                 <a:ea typeface="Times New Roman" panose="02020603050405020304" pitchFamily="18" charset="0"/>
               </a:rPr>
               <a:t>Evaluation Results for Model 3</a:t>
@@ -8904,14 +8973,13 @@
           <a:lstStyle/>
           <a:p>
             <a:r>
-              <a:rPr lang="en-US" sz="2200">
+              <a:rPr lang="en-US" sz="2200" dirty="0">
                 <a:effectLst/>
-                <a:latin typeface="Arial" panose="020B0604020202020204" pitchFamily="34" charset="0"/>
                 <a:ea typeface="Times New Roman" panose="02020603050405020304" pitchFamily="18" charset="0"/>
               </a:rPr>
               <a:t>Model 4: Convolutional neural network with three Conv2D layers and regularization layers</a:t>
             </a:r>
-            <a:endParaRPr lang="en-US" sz="2200"/>
+            <a:endParaRPr lang="en-US" sz="2200" dirty="0"/>
           </a:p>
         </p:txBody>
       </p:sp>
@@ -9100,7 +9168,7 @@
         </p:spPr>
         <p:txBody>
           <a:bodyPr numCol="2" anchor="ctr">
-            <a:normAutofit/>
+            <a:normAutofit lnSpcReduction="10000"/>
           </a:bodyPr>
           <a:lstStyle/>
           <a:p>
@@ -9109,7 +9177,7 @@
               <a:buChar char="q"/>
             </a:pPr>
             <a:r>
-              <a:rPr lang="en-US" sz="1300"/>
+              <a:rPr lang="en-US" sz="1300" dirty="0"/>
               <a:t>Model 4 contains an input layer, three Conv2D layers with MaxPolling2D and BatchNorm2D layers, two Dense layers, and an output layer.</a:t>
             </a:r>
           </a:p>
@@ -9119,7 +9187,7 @@
               <a:buChar char="q"/>
             </a:pPr>
             <a:r>
-              <a:rPr lang="en-US" sz="1300"/>
+              <a:rPr lang="en-US" sz="1300" dirty="0"/>
               <a:t> The activation function, optimizer, loss function, and model metrics remains same with previous models. </a:t>
             </a:r>
           </a:p>
@@ -9129,8 +9197,16 @@
               <a:buChar char="q"/>
             </a:pPr>
             <a:r>
-              <a:rPr lang="en-US" sz="1300"/>
-              <a:t> Additionally,  I have introduced learning rate scheduling and EarlyStopping for adaptive training.</a:t>
+              <a:rPr lang="en-US" sz="1300" dirty="0"/>
+              <a:t> Additionally,  I have introduced learning rate scheduling and </a:t>
+            </a:r>
+            <a:r>
+              <a:rPr lang="en-US" sz="1300" dirty="0" err="1"/>
+              <a:t>EarlyStopping</a:t>
+            </a:r>
+            <a:r>
+              <a:rPr lang="en-US" sz="1300" dirty="0"/>
+              <a:t> for adaptive training.</a:t>
             </a:r>
           </a:p>
           <a:p>
@@ -9139,8 +9215,18 @@
               <a:buChar char="q"/>
             </a:pPr>
             <a:r>
-              <a:rPr lang="en-US" sz="1300"/>
+              <a:rPr lang="en-US" sz="1300" dirty="0"/>
               <a:t> BatchNorm2D, and Dropout layers used for regularization.</a:t>
+            </a:r>
+          </a:p>
+          <a:p>
+            <a:pPr>
+              <a:buFont typeface="Wingdings" panose="05000000000000000000" pitchFamily="2" charset="2"/>
+              <a:buChar char="q"/>
+            </a:pPr>
+            <a:r>
+              <a:rPr lang="en-US" sz="1300" dirty="0"/>
+              <a:t>Model’s performance increased by increasing model’s capacity. </a:t>
             </a:r>
           </a:p>
         </p:txBody>
@@ -9309,7 +9395,6 @@
             <a:r>
               <a:rPr lang="en-US" sz="5400" dirty="0">
                 <a:effectLst/>
-                <a:latin typeface="Arial" panose="020B0604020202020204" pitchFamily="34" charset="0"/>
                 <a:ea typeface="Times New Roman" panose="02020603050405020304" pitchFamily="18" charset="0"/>
                 <a:cs typeface="Times New Roman" panose="02020603050405020304" pitchFamily="18" charset="0"/>
               </a:rPr>
@@ -9702,7 +9787,6 @@
             <a:r>
               <a:rPr lang="en-US" sz="2400" dirty="0">
                 <a:effectLst/>
-                <a:latin typeface="Arial" panose="020B0604020202020204" pitchFamily="34" charset="0"/>
                 <a:ea typeface="Times New Roman" panose="02020603050405020304" pitchFamily="18" charset="0"/>
                 <a:cs typeface="Times New Roman" panose="02020603050405020304" pitchFamily="18" charset="0"/>
               </a:rPr>
@@ -9841,12 +9925,14 @@
             <a:r>
               <a:rPr lang="en-US" sz="3000" dirty="0">
                 <a:effectLst/>
-                <a:latin typeface="Arial" panose="020B0604020202020204" pitchFamily="34" charset="0"/>
+                <a:latin typeface="+mn-lt"/>
                 <a:ea typeface="Times New Roman" panose="02020603050405020304" pitchFamily="18" charset="0"/>
               </a:rPr>
               <a:t>Evaluation Results for Model 4</a:t>
             </a:r>
-            <a:endParaRPr lang="en-US" sz="3000" dirty="0"/>
+            <a:endParaRPr lang="en-US" sz="3000" dirty="0">
+              <a:latin typeface="+mn-lt"/>
+            </a:endParaRPr>
           </a:p>
         </p:txBody>
       </p:sp>
@@ -10424,14 +10510,16 @@
           <a:lstStyle/>
           <a:p>
             <a:r>
-              <a:rPr lang="en-US" sz="2500">
+              <a:rPr lang="en-US" sz="2500" dirty="0">
                 <a:effectLst/>
-                <a:latin typeface="Arial" panose="020B0604020202020204" pitchFamily="34" charset="0"/>
+                <a:latin typeface="+mn-lt"/>
                 <a:ea typeface="Times New Roman" panose="02020603050405020304" pitchFamily="18" charset="0"/>
               </a:rPr>
               <a:t>Model 5: Convolutional neural network with four Conv2D layers and regularization layers</a:t>
             </a:r>
-            <a:endParaRPr lang="en-US" sz="2500"/>
+            <a:endParaRPr lang="en-US" sz="2500" dirty="0">
+              <a:latin typeface="+mn-lt"/>
+            </a:endParaRPr>
           </a:p>
         </p:txBody>
       </p:sp>
@@ -10620,7 +10708,7 @@
         </p:spPr>
         <p:txBody>
           <a:bodyPr numCol="2" anchor="ctr">
-            <a:normAutofit/>
+            <a:normAutofit fontScale="85000" lnSpcReduction="20000"/>
           </a:bodyPr>
           <a:lstStyle/>
           <a:p>
@@ -10653,7 +10741,7 @@
               <a:t>I have introduced learning rate scheduling and </a:t>
             </a:r>
             <a:r>
-              <a:rPr lang="en-US" sz="1400"/>
+              <a:rPr lang="en-US" sz="1400" dirty="0" err="1"/>
               <a:t>EarlyStopping</a:t>
             </a:r>
             <a:r>
@@ -10669,6 +10757,36 @@
             <a:r>
               <a:rPr lang="en-US" sz="1400" dirty="0"/>
               <a:t> BatchNorm2D, and Dropout layers for regularization</a:t>
+            </a:r>
+          </a:p>
+          <a:p>
+            <a:pPr>
+              <a:buFont typeface="Wingdings" panose="05000000000000000000" pitchFamily="2" charset="2"/>
+              <a:buChar char="q"/>
+            </a:pPr>
+            <a:r>
+              <a:rPr lang="en-US" sz="1400" dirty="0"/>
+              <a:t>Model shows optimum performance.</a:t>
+            </a:r>
+          </a:p>
+          <a:p>
+            <a:pPr>
+              <a:buFont typeface="Wingdings" panose="05000000000000000000" pitchFamily="2" charset="2"/>
+              <a:buChar char="q"/>
+            </a:pPr>
+            <a:r>
+              <a:rPr lang="en-US" sz="1400" dirty="0"/>
+              <a:t>Did not add more Conv2D layers due to computational limitations.</a:t>
+            </a:r>
+          </a:p>
+          <a:p>
+            <a:pPr>
+              <a:buFont typeface="Wingdings" panose="05000000000000000000" pitchFamily="2" charset="2"/>
+              <a:buChar char="q"/>
+            </a:pPr>
+            <a:r>
+              <a:rPr lang="en-US" sz="1400" dirty="0"/>
+              <a:t>Performed hyperparameter tuning on model5 to check more accuracy. Did not receive any improvement.</a:t>
             </a:r>
           </a:p>
         </p:txBody>
@@ -11323,7 +11441,6 @@
             <a:r>
               <a:rPr lang="en-US" sz="5400" dirty="0">
                 <a:effectLst/>
-                <a:latin typeface="Arial" panose="020B0604020202020204" pitchFamily="34" charset="0"/>
                 <a:ea typeface="Times New Roman" panose="02020603050405020304" pitchFamily="18" charset="0"/>
               </a:rPr>
               <a:t>Results and Findings</a:t>
@@ -11710,20 +11827,10 @@
             <a:r>
               <a:rPr lang="en-US" sz="1700" dirty="0">
                 <a:effectLst/>
-                <a:latin typeface="Calibri" panose="020F0502020204030204" pitchFamily="34" charset="0"/>
                 <a:ea typeface="Times New Roman" panose="02020603050405020304" pitchFamily="18" charset="0"/>
                 <a:cs typeface="Times New Roman" panose="02020603050405020304" pitchFamily="18" charset="0"/>
               </a:rPr>
-              <a:t> Model 1</a:t>
-            </a:r>
-            <a:r>
-              <a:rPr lang="en-US" sz="1700" dirty="0">
-                <a:effectLst/>
-                <a:latin typeface="Arial" panose="020B0604020202020204" pitchFamily="34" charset="0"/>
-                <a:ea typeface="Times New Roman" panose="02020603050405020304" pitchFamily="18" charset="0"/>
-                <a:cs typeface="Times New Roman" panose="02020603050405020304" pitchFamily="18" charset="0"/>
-              </a:rPr>
-              <a:t> results training accuracy of 0.893, validation accuracy of 0.822, and test accuracy of 0.834. The weighted value of precision, recall, and F1-score is 0.85, 0.83, and 0.83, respectively.</a:t>
+              <a:t> Model 1 results training accuracy of 0.893, validation accuracy of 0.822, and test accuracy of 0.834. The weighted value of precision, recall, and F1-score is 0.85, 0.83, and 0.83, respectively.</a:t>
             </a:r>
           </a:p>
           <a:p>
@@ -11734,20 +11841,10 @@
             <a:r>
               <a:rPr lang="en-US" sz="1700" dirty="0">
                 <a:effectLst/>
-                <a:latin typeface="Calibri" panose="020F0502020204030204" pitchFamily="34" charset="0"/>
                 <a:ea typeface="Times New Roman" panose="02020603050405020304" pitchFamily="18" charset="0"/>
                 <a:cs typeface="Times New Roman" panose="02020603050405020304" pitchFamily="18" charset="0"/>
               </a:rPr>
-              <a:t> Model 2</a:t>
-            </a:r>
-            <a:r>
-              <a:rPr lang="en-US" sz="1700" dirty="0">
-                <a:effectLst/>
-                <a:latin typeface="Arial" panose="020B0604020202020204" pitchFamily="34" charset="0"/>
-                <a:ea typeface="Times New Roman" panose="02020603050405020304" pitchFamily="18" charset="0"/>
-                <a:cs typeface="Times New Roman" panose="02020603050405020304" pitchFamily="18" charset="0"/>
-              </a:rPr>
-              <a:t> results training accuracy of 0.999, validation accuracy of 0.916, and test accuracy of 0.938. The weighted value of precision, recall, and F1-score is 0.94.</a:t>
+              <a:t> Model 2 results training accuracy of 0.999, validation accuracy of 0.916, and test accuracy of 0.938. The weighted value of precision, recall, and F1-score is 0.94. </a:t>
             </a:r>
           </a:p>
           <a:p>
@@ -11757,7 +11854,6 @@
             </a:pPr>
             <a:r>
               <a:rPr lang="en-US" sz="1700" dirty="0">
-                <a:latin typeface="Arial" panose="020B0604020202020204" pitchFamily="34" charset="0"/>
                 <a:ea typeface="Times New Roman" panose="02020603050405020304" pitchFamily="18" charset="0"/>
                 <a:cs typeface="Times New Roman" panose="02020603050405020304" pitchFamily="18" charset="0"/>
               </a:rPr>
@@ -11766,20 +11862,10 @@
             <a:r>
               <a:rPr lang="en-US" sz="1700" dirty="0">
                 <a:effectLst/>
-                <a:latin typeface="Calibri" panose="020F0502020204030204" pitchFamily="34" charset="0"/>
                 <a:ea typeface="Times New Roman" panose="02020603050405020304" pitchFamily="18" charset="0"/>
                 <a:cs typeface="Times New Roman" panose="02020603050405020304" pitchFamily="18" charset="0"/>
               </a:rPr>
-              <a:t>Model 3</a:t>
-            </a:r>
-            <a:r>
-              <a:rPr lang="en-US" sz="1700" dirty="0">
-                <a:effectLst/>
-                <a:latin typeface="Arial" panose="020B0604020202020204" pitchFamily="34" charset="0"/>
-                <a:ea typeface="Times New Roman" panose="02020603050405020304" pitchFamily="18" charset="0"/>
-                <a:cs typeface="Times New Roman" panose="02020603050405020304" pitchFamily="18" charset="0"/>
-              </a:rPr>
-              <a:t> results training accuracy of 0.988, validation accuracy of 0.921, and test accuracy of 0.932. The weighted value of precision, recall, and F1-score is 0.93.</a:t>
+              <a:t>Model 3 results training accuracy of 0.988, validation accuracy of 0.921, and test accuracy of 0.932. The weighted value of precision, recall, and F1-score is 0.93. </a:t>
             </a:r>
           </a:p>
           <a:p>
@@ -11790,29 +11876,10 @@
             <a:r>
               <a:rPr lang="en-US" sz="1700" dirty="0">
                 <a:effectLst/>
-                <a:latin typeface="Arial" panose="020B0604020202020204" pitchFamily="34" charset="0"/>
                 <a:ea typeface="Times New Roman" panose="02020603050405020304" pitchFamily="18" charset="0"/>
                 <a:cs typeface="Times New Roman" panose="02020603050405020304" pitchFamily="18" charset="0"/>
               </a:rPr>
-              <a:t> </a:t>
-            </a:r>
-            <a:r>
-              <a:rPr lang="en-US" sz="1700" dirty="0">
-                <a:effectLst/>
-                <a:latin typeface="Calibri" panose="020F0502020204030204" pitchFamily="34" charset="0"/>
-                <a:ea typeface="Times New Roman" panose="02020603050405020304" pitchFamily="18" charset="0"/>
-                <a:cs typeface="Times New Roman" panose="02020603050405020304" pitchFamily="18" charset="0"/>
-              </a:rPr>
-              <a:t>Model 4</a:t>
-            </a:r>
-            <a:r>
-              <a:rPr lang="en-US" sz="1700" dirty="0">
-                <a:effectLst/>
-                <a:latin typeface="Arial" panose="020B0604020202020204" pitchFamily="34" charset="0"/>
-                <a:ea typeface="Times New Roman" panose="02020603050405020304" pitchFamily="18" charset="0"/>
-                <a:cs typeface="Times New Roman" panose="02020603050405020304" pitchFamily="18" charset="0"/>
-              </a:rPr>
-              <a:t> results training accuracy of 0.990, validation accuracy of 0.955, and test accuracy of 0.972. The weighted value of precision, recall, and F1-score is 0.97.</a:t>
+              <a:t> Model 4 results training accuracy of 0.990, validation accuracy of 0.955, and test accuracy of 0.972. The weighted value of precision, recall, and F1-score is 0.97.</a:t>
             </a:r>
           </a:p>
           <a:p>
@@ -11823,89 +11890,26 @@
             <a:r>
               <a:rPr lang="en-US" sz="1700" dirty="0">
                 <a:effectLst/>
-                <a:latin typeface="Arial" panose="020B0604020202020204" pitchFamily="34" charset="0"/>
                 <a:ea typeface="Times New Roman" panose="02020603050405020304" pitchFamily="18" charset="0"/>
                 <a:cs typeface="Times New Roman" panose="02020603050405020304" pitchFamily="18" charset="0"/>
               </a:rPr>
-              <a:t> Finally, the optimum model (model 5) results training accuracy </a:t>
-            </a:r>
-            <a:r>
-              <a:rPr lang="en-US" sz="1700">
-                <a:effectLst/>
-                <a:latin typeface="Arial" panose="020B0604020202020204" pitchFamily="34" charset="0"/>
-                <a:ea typeface="Times New Roman" panose="02020603050405020304" pitchFamily="18" charset="0"/>
-                <a:cs typeface="Times New Roman" panose="02020603050405020304" pitchFamily="18" charset="0"/>
-              </a:rPr>
-              <a:t>of </a:t>
-            </a:r>
-            <a:r>
-              <a:rPr lang="en-US" sz="1700">
-                <a:latin typeface="Arial" panose="020B0604020202020204" pitchFamily="34" charset="0"/>
+              <a:t> Finally, the optimum model (model 5) results training accuracy of </a:t>
+            </a:r>
+            <a:r>
+              <a:rPr lang="en-US" sz="1700" dirty="0">
                 <a:ea typeface="Times New Roman" panose="02020603050405020304" pitchFamily="18" charset="0"/>
                 <a:cs typeface="Times New Roman" panose="02020603050405020304" pitchFamily="18" charset="0"/>
               </a:rPr>
               <a:t>99.9</a:t>
             </a:r>
             <a:r>
-              <a:rPr lang="en-US" sz="1700">
+              <a:rPr lang="en-US" sz="1700" dirty="0">
                 <a:effectLst/>
-                <a:latin typeface="Arial" panose="020B0604020202020204" pitchFamily="34" charset="0"/>
                 <a:ea typeface="Times New Roman" panose="02020603050405020304" pitchFamily="18" charset="0"/>
                 <a:cs typeface="Times New Roman" panose="02020603050405020304" pitchFamily="18" charset="0"/>
               </a:rPr>
-              <a:t>%, </a:t>
-            </a:r>
-            <a:r>
-              <a:rPr lang="en-US" sz="1700" dirty="0">
-                <a:effectLst/>
-                <a:latin typeface="Arial" panose="020B0604020202020204" pitchFamily="34" charset="0"/>
-                <a:ea typeface="Times New Roman" panose="02020603050405020304" pitchFamily="18" charset="0"/>
-                <a:cs typeface="Times New Roman" panose="02020603050405020304" pitchFamily="18" charset="0"/>
-              </a:rPr>
-              <a:t>validation accuracy </a:t>
-            </a:r>
-            <a:r>
-              <a:rPr lang="en-US" sz="1700">
-                <a:effectLst/>
-                <a:latin typeface="Arial" panose="020B0604020202020204" pitchFamily="34" charset="0"/>
-                <a:ea typeface="Times New Roman" panose="02020603050405020304" pitchFamily="18" charset="0"/>
-                <a:cs typeface="Times New Roman" panose="02020603050405020304" pitchFamily="18" charset="0"/>
-              </a:rPr>
-              <a:t>of 97.1%, </a:t>
-            </a:r>
-            <a:r>
-              <a:rPr lang="en-US" sz="1700" dirty="0">
-                <a:effectLst/>
-                <a:latin typeface="Arial" panose="020B0604020202020204" pitchFamily="34" charset="0"/>
-                <a:ea typeface="Times New Roman" panose="02020603050405020304" pitchFamily="18" charset="0"/>
-                <a:cs typeface="Times New Roman" panose="02020603050405020304" pitchFamily="18" charset="0"/>
-              </a:rPr>
-              <a:t>and test accuracy </a:t>
-            </a:r>
-            <a:r>
-              <a:rPr lang="en-US" sz="1700">
-                <a:effectLst/>
-                <a:latin typeface="Arial" panose="020B0604020202020204" pitchFamily="34" charset="0"/>
-                <a:ea typeface="Times New Roman" panose="02020603050405020304" pitchFamily="18" charset="0"/>
-                <a:cs typeface="Times New Roman" panose="02020603050405020304" pitchFamily="18" charset="0"/>
-              </a:rPr>
-              <a:t>of 98.1%. </a:t>
-            </a:r>
-            <a:r>
-              <a:rPr lang="en-US" sz="1700" dirty="0">
-                <a:effectLst/>
-                <a:latin typeface="Arial" panose="020B0604020202020204" pitchFamily="34" charset="0"/>
-                <a:ea typeface="Times New Roman" panose="02020603050405020304" pitchFamily="18" charset="0"/>
-                <a:cs typeface="Times New Roman" panose="02020603050405020304" pitchFamily="18" charset="0"/>
-              </a:rPr>
-              <a:t>The weighted value of precision, recall, and F1-score is 98%.</a:t>
-            </a:r>
-            <a:endParaRPr lang="en-US" sz="1700" dirty="0">
-              <a:effectLst/>
-              <a:latin typeface="Calibri" panose="020F0502020204030204" pitchFamily="34" charset="0"/>
-              <a:ea typeface="Times New Roman" panose="02020603050405020304" pitchFamily="18" charset="0"/>
-              <a:cs typeface="Times New Roman" panose="02020603050405020304" pitchFamily="18" charset="0"/>
-            </a:endParaRPr>
+              <a:t>%, validation accuracy of 97.1%, and test accuracy of 98.1%. The weighted value of precision, recall, and F1-score is 98%.</a:t>
+            </a:r>
           </a:p>
         </p:txBody>
       </p:sp>
@@ -12036,14 +12040,13 @@
           <a:lstStyle/>
           <a:p>
             <a:r>
-              <a:rPr lang="en-US" sz="3700">
+              <a:rPr lang="en-US" sz="3700" dirty="0">
                 <a:effectLst/>
-                <a:latin typeface="Arial" panose="020B0604020202020204" pitchFamily="34" charset="0"/>
                 <a:ea typeface="Times New Roman" panose="02020603050405020304" pitchFamily="18" charset="0"/>
               </a:rPr>
               <a:t>Table showing the comparison among all Models Outcome</a:t>
             </a:r>
-            <a:endParaRPr lang="en-US" sz="3700"/>
+            <a:endParaRPr lang="en-US" sz="3700" dirty="0"/>
           </a:p>
         </p:txBody>
       </p:sp>
@@ -14287,7 +14290,6 @@
             <a:r>
               <a:rPr lang="en-US" sz="2000" dirty="0">
                 <a:effectLst/>
-                <a:latin typeface="Arial" panose="020B0604020202020204" pitchFamily="34" charset="0"/>
                 <a:ea typeface="Times New Roman" panose="02020603050405020304" pitchFamily="18" charset="0"/>
                 <a:cs typeface="Times New Roman" panose="02020603050405020304" pitchFamily="18" charset="0"/>
               </a:rPr>
@@ -14301,7 +14303,6 @@
             </a:pPr>
             <a:r>
               <a:rPr lang="en-US" sz="2000" dirty="0">
-                <a:latin typeface="Arial" panose="020B0604020202020204" pitchFamily="34" charset="0"/>
                 <a:ea typeface="Times New Roman" panose="02020603050405020304" pitchFamily="18" charset="0"/>
                 <a:cs typeface="Times New Roman" panose="02020603050405020304" pitchFamily="18" charset="0"/>
               </a:rPr>
@@ -14310,7 +14311,6 @@
             <a:r>
               <a:rPr lang="en-US" sz="2000" dirty="0">
                 <a:effectLst/>
-                <a:latin typeface="Arial" panose="020B0604020202020204" pitchFamily="34" charset="0"/>
                 <a:ea typeface="Times New Roman" panose="02020603050405020304" pitchFamily="18" charset="0"/>
                 <a:cs typeface="Times New Roman" panose="02020603050405020304" pitchFamily="18" charset="0"/>
               </a:rPr>
@@ -14318,7 +14318,6 @@
             </a:r>
             <a:r>
               <a:rPr lang="en-US" sz="2000" dirty="0">
-                <a:latin typeface="Arial" panose="020B0604020202020204" pitchFamily="34" charset="0"/>
                 <a:ea typeface="Times New Roman" panose="02020603050405020304" pitchFamily="18" charset="0"/>
                 <a:cs typeface="Times New Roman" panose="02020603050405020304" pitchFamily="18" charset="0"/>
               </a:rPr>
@@ -14327,7 +14326,6 @@
             <a:r>
               <a:rPr lang="en-US" sz="2000" dirty="0">
                 <a:effectLst/>
-                <a:latin typeface="Arial" panose="020B0604020202020204" pitchFamily="34" charset="0"/>
                 <a:ea typeface="Times New Roman" panose="02020603050405020304" pitchFamily="18" charset="0"/>
                 <a:cs typeface="Times New Roman" panose="02020603050405020304" pitchFamily="18" charset="0"/>
               </a:rPr>
@@ -14341,7 +14339,6 @@
             </a:pPr>
             <a:r>
               <a:rPr lang="en-US" sz="2000" dirty="0">
-                <a:latin typeface="Arial" panose="020B0604020202020204" pitchFamily="34" charset="0"/>
                 <a:ea typeface="Times New Roman" panose="02020603050405020304" pitchFamily="18" charset="0"/>
                 <a:cs typeface="Times New Roman" panose="02020603050405020304" pitchFamily="18" charset="0"/>
               </a:rPr>
@@ -14350,7 +14347,6 @@
             <a:r>
               <a:rPr lang="en-US" sz="2000" dirty="0">
                 <a:effectLst/>
-                <a:latin typeface="Arial" panose="020B0604020202020204" pitchFamily="34" charset="0"/>
                 <a:ea typeface="Times New Roman" panose="02020603050405020304" pitchFamily="18" charset="0"/>
                 <a:cs typeface="Times New Roman" panose="02020603050405020304" pitchFamily="18" charset="0"/>
               </a:rPr>
@@ -14364,7 +14360,6 @@
             </a:pPr>
             <a:r>
               <a:rPr lang="en-US" sz="2000" dirty="0">
-                <a:latin typeface="Arial" panose="020B0604020202020204" pitchFamily="34" charset="0"/>
                 <a:ea typeface="Times New Roman" panose="02020603050405020304" pitchFamily="18" charset="0"/>
                 <a:cs typeface="Times New Roman" panose="02020603050405020304" pitchFamily="18" charset="0"/>
               </a:rPr>
@@ -14372,7 +14367,6 @@
             </a:r>
             <a:endParaRPr lang="en-US" sz="2000" dirty="0">
               <a:effectLst/>
-              <a:latin typeface="Arial" panose="020B0604020202020204" pitchFamily="34" charset="0"/>
               <a:ea typeface="Times New Roman" panose="02020603050405020304" pitchFamily="18" charset="0"/>
               <a:cs typeface="Times New Roman" panose="02020603050405020304" pitchFamily="18" charset="0"/>
             </a:endParaRPr>
@@ -14852,7 +14846,7 @@
               <a:buNone/>
             </a:pPr>
             <a:r>
-              <a:rPr lang="en-US" sz="2200"/>
+              <a:rPr lang="en-US" sz="2200" dirty="0"/>
               <a:t>Thank You</a:t>
             </a:r>
           </a:p>
@@ -14987,7 +14981,6 @@
             <a:r>
               <a:rPr lang="en-US" sz="5000" dirty="0">
                 <a:effectLst/>
-                <a:latin typeface="Arial" panose="020B0604020202020204" pitchFamily="34" charset="0"/>
                 <a:ea typeface="Times New Roman" panose="02020603050405020304" pitchFamily="18" charset="0"/>
                 <a:cs typeface="Times New Roman" panose="02020603050405020304" pitchFamily="18" charset="0"/>
               </a:rPr>
@@ -15389,7 +15382,6 @@
             <a:r>
               <a:rPr lang="en-US" sz="2000" dirty="0">
                 <a:effectLst/>
-                <a:latin typeface="Arial" panose="020B0604020202020204" pitchFamily="34" charset="0"/>
                 <a:ea typeface="Times New Roman" panose="02020603050405020304" pitchFamily="18" charset="0"/>
                 <a:cs typeface="Times New Roman" panose="02020603050405020304" pitchFamily="18" charset="0"/>
               </a:rPr>
@@ -15408,7 +15400,6 @@
             </a:pPr>
             <a:endParaRPr lang="en-US" sz="2000" dirty="0">
               <a:effectLst/>
-              <a:latin typeface="Arial" panose="020B0604020202020204" pitchFamily="34" charset="0"/>
               <a:ea typeface="Times New Roman" panose="02020603050405020304" pitchFamily="18" charset="0"/>
               <a:cs typeface="Times New Roman" panose="02020603050405020304" pitchFamily="18" charset="0"/>
             </a:endParaRPr>
@@ -15427,7 +15418,6 @@
             <a:r>
               <a:rPr lang="en-US" sz="2000" dirty="0">
                 <a:effectLst/>
-                <a:latin typeface="Arial" panose="020B0604020202020204" pitchFamily="34" charset="0"/>
                 <a:ea typeface="Times New Roman" panose="02020603050405020304" pitchFamily="18" charset="0"/>
                 <a:cs typeface="Times New Roman" panose="02020603050405020304" pitchFamily="18" charset="0"/>
               </a:rPr>
@@ -15446,7 +15436,6 @@
             </a:pPr>
             <a:endParaRPr lang="en-US" sz="2000" dirty="0">
               <a:effectLst/>
-              <a:latin typeface="Arial" panose="020B0604020202020204" pitchFamily="34" charset="0"/>
               <a:ea typeface="Times New Roman" panose="02020603050405020304" pitchFamily="18" charset="0"/>
               <a:cs typeface="Times New Roman" panose="02020603050405020304" pitchFamily="18" charset="0"/>
             </a:endParaRPr>
@@ -15464,7 +15453,6 @@
             </a:pPr>
             <a:r>
               <a:rPr lang="en-US" sz="2000" dirty="0">
-                <a:latin typeface="Arial" panose="020B0604020202020204" pitchFamily="34" charset="0"/>
                 <a:ea typeface="Times New Roman" panose="02020603050405020304" pitchFamily="18" charset="0"/>
                 <a:cs typeface="Times New Roman" panose="02020603050405020304" pitchFamily="18" charset="0"/>
               </a:rPr>
@@ -15473,14 +15461,12 @@
             <a:r>
               <a:rPr lang="en-US" sz="2000" dirty="0">
                 <a:effectLst/>
-                <a:latin typeface="Arial" panose="020B0604020202020204" pitchFamily="34" charset="0"/>
                 <a:ea typeface="Times New Roman" panose="02020603050405020304" pitchFamily="18" charset="0"/>
                 <a:cs typeface="Times New Roman" panose="02020603050405020304" pitchFamily="18" charset="0"/>
               </a:rPr>
               <a:t>Early detection and classification of brain tumors is an important research domain in the field of medical imaging and accordingly helps in selecting the most convenient treatment method to save patients life.</a:t>
             </a:r>
             <a:endParaRPr lang="en-US" sz="2000" dirty="0">
-              <a:latin typeface="Arial" panose="020B0604020202020204" pitchFamily="34" charset="0"/>
               <a:ea typeface="Times New Roman" panose="02020603050405020304" pitchFamily="18" charset="0"/>
               <a:cs typeface="Times New Roman" panose="02020603050405020304" pitchFamily="18" charset="0"/>
             </a:endParaRPr>
@@ -15614,10 +15600,9 @@
           <a:lstStyle/>
           <a:p>
             <a:r>
-              <a:rPr lang="en-US" sz="5000"/>
+              <a:rPr lang="en-US" sz="5000" dirty="0"/>
               <a:t>Stakeholders</a:t>
             </a:r>
-            <a:endParaRPr lang="en-US" sz="5000" dirty="0"/>
           </a:p>
         </p:txBody>
       </p:sp>
@@ -15997,7 +15982,7 @@
               <a:buChar char="q"/>
             </a:pPr>
             <a:r>
-              <a:rPr lang="en-US" sz="3200"/>
+              <a:rPr lang="en-US" sz="3200" dirty="0"/>
               <a:t> Doctors </a:t>
             </a:r>
           </a:p>
@@ -16007,7 +15992,7 @@
               <a:buChar char="q"/>
             </a:pPr>
             <a:r>
-              <a:rPr lang="en-US" sz="3200"/>
+              <a:rPr lang="en-US" sz="3200" dirty="0"/>
               <a:t> Hospitals</a:t>
             </a:r>
           </a:p>
@@ -16017,7 +16002,7 @@
               <a:buChar char="q"/>
             </a:pPr>
             <a:r>
-              <a:rPr lang="en-US" sz="3200"/>
+              <a:rPr lang="en-US" sz="3200" dirty="0"/>
               <a:t> Medical Centers</a:t>
             </a:r>
           </a:p>
@@ -16027,10 +16012,9 @@
               <a:buChar char="q"/>
             </a:pPr>
             <a:r>
-              <a:rPr lang="en-US" sz="3200"/>
+              <a:rPr lang="en-US" sz="3200" dirty="0"/>
               <a:t> Patients</a:t>
             </a:r>
-            <a:endParaRPr lang="en-US" sz="3200" dirty="0"/>
           </a:p>
         </p:txBody>
       </p:sp>
@@ -16531,30 +16515,9 @@
         </p:spPr>
         <p:txBody>
           <a:bodyPr>
-            <a:normAutofit/>
+            <a:normAutofit fontScale="92500" lnSpcReduction="20000"/>
           </a:bodyPr>
           <a:lstStyle/>
-          <a:p>
-            <a:pPr marR="0">
-              <a:spcBef>
-                <a:spcPts val="0"/>
-              </a:spcBef>
-              <a:spcAft>
-                <a:spcPts val="600"/>
-              </a:spcAft>
-              <a:buFont typeface="Wingdings" panose="05000000000000000000" pitchFamily="2" charset="2"/>
-              <a:buChar char="q"/>
-            </a:pPr>
-            <a:r>
-              <a:rPr lang="en-US" sz="2000" dirty="0">
-                <a:effectLst/>
-                <a:latin typeface="Arial" panose="020B0604020202020204" pitchFamily="34" charset="0"/>
-                <a:ea typeface="Calibri" panose="020F0502020204030204" pitchFamily="34" charset="0"/>
-                <a:cs typeface="Times New Roman" panose="02020603050405020304" pitchFamily="18" charset="0"/>
-              </a:rPr>
-              <a:t> Glioma Tumor: Glioma is a type of tumor that occurs in the brain and spinal cord. Gliomas begin in the gluey supportive cells (glial cells) that surround nerve cells and help them function. </a:t>
-            </a:r>
-          </a:p>
           <a:p>
             <a:pPr marL="0" marR="0" indent="0">
               <a:spcBef>
@@ -16565,12 +16528,30 @@
               </a:spcAft>
               <a:buNone/>
             </a:pPr>
-            <a:endParaRPr lang="en-US" sz="2000" dirty="0">
-              <a:effectLst/>
-              <a:latin typeface="Arial" panose="020B0604020202020204" pitchFamily="34" charset="0"/>
-              <a:ea typeface="Calibri" panose="020F0502020204030204" pitchFamily="34" charset="0"/>
-              <a:cs typeface="Times New Roman" panose="02020603050405020304" pitchFamily="18" charset="0"/>
-            </a:endParaRPr>
+            <a:r>
+              <a:rPr lang="en-US" sz="2100" dirty="0">
+                <a:effectLst/>
+                <a:ea typeface="Calibri" panose="020F0502020204030204" pitchFamily="34" charset="0"/>
+                <a:cs typeface="Times New Roman" panose="02020603050405020304" pitchFamily="18" charset="0"/>
+              </a:rPr>
+              <a:t>Glioma </a:t>
+            </a:r>
+            <a:r>
+              <a:rPr lang="en-US" sz="2200" dirty="0">
+                <a:effectLst/>
+                <a:ea typeface="Calibri" panose="020F0502020204030204" pitchFamily="34" charset="0"/>
+                <a:cs typeface="Times New Roman" panose="02020603050405020304" pitchFamily="18" charset="0"/>
+              </a:rPr>
+              <a:t>Tumor</a:t>
+            </a:r>
+            <a:r>
+              <a:rPr lang="en-US" sz="2100" dirty="0">
+                <a:effectLst/>
+                <a:ea typeface="Calibri" panose="020F0502020204030204" pitchFamily="34" charset="0"/>
+                <a:cs typeface="Times New Roman" panose="02020603050405020304" pitchFamily="18" charset="0"/>
+              </a:rPr>
+              <a:t>: </a:t>
+            </a:r>
           </a:p>
           <a:p>
             <a:pPr>
@@ -16581,44 +16562,17 @@
                 <a:spcPts val="600"/>
               </a:spcAft>
               <a:buFont typeface="Wingdings" panose="05000000000000000000" pitchFamily="2" charset="2"/>
-              <a:buChar char="q"/>
+              <a:buChar char="§"/>
             </a:pPr>
             <a:r>
-              <a:rPr lang="en-US" sz="2000" dirty="0">
-                <a:latin typeface="Arial" panose="020B0604020202020204" pitchFamily="34" charset="0"/>
-                <a:ea typeface="Calibri" panose="020F0502020204030204" pitchFamily="34" charset="0"/>
+              <a:rPr lang="en-US" sz="2100" dirty="0">
                 <a:cs typeface="Times New Roman" panose="02020603050405020304" pitchFamily="18" charset="0"/>
               </a:rPr>
-              <a:t> </a:t>
-            </a:r>
-            <a:r>
-              <a:rPr lang="en-US" sz="2000" dirty="0">
-                <a:effectLst/>
-                <a:latin typeface="Arial" panose="020B0604020202020204" pitchFamily="34" charset="0"/>
-                <a:ea typeface="Calibri" panose="020F0502020204030204" pitchFamily="34" charset="0"/>
-                <a:cs typeface="Times New Roman" panose="02020603050405020304" pitchFamily="18" charset="0"/>
-              </a:rPr>
-              <a:t>Pituitary Tumor</a:t>
-            </a:r>
-            <a:r>
-              <a:rPr lang="en-US" sz="2000" dirty="0">
-                <a:latin typeface="Calibri" panose="020F0502020204030204" pitchFamily="34" charset="0"/>
-                <a:ea typeface="Calibri" panose="020F0502020204030204" pitchFamily="34" charset="0"/>
-                <a:cs typeface="Times New Roman" panose="02020603050405020304" pitchFamily="18" charset="0"/>
-              </a:rPr>
-              <a:t>: </a:t>
-            </a:r>
-            <a:r>
-              <a:rPr lang="en-US" sz="2000" dirty="0">
-                <a:effectLst/>
-                <a:latin typeface="Arial" panose="020B0604020202020204" pitchFamily="34" charset="0"/>
-                <a:ea typeface="Calibri" panose="020F0502020204030204" pitchFamily="34" charset="0"/>
-              </a:rPr>
-              <a:t>Pituitary tumors are abnormal growths that develop in our pituitary gland. Some pituitary tumors result in too much of the hormones that regulate important functions of our body.</a:t>
-            </a:r>
-          </a:p>
-          <a:p>
-            <a:pPr marR="0">
+              <a:t>Glioma is a type of tumor that occurs in the brain and spinal cord. </a:t>
+            </a:r>
+          </a:p>
+          <a:p>
+            <a:pPr>
               <a:spcBef>
                 <a:spcPts val="0"/>
               </a:spcBef>
@@ -16626,9 +16580,115 @@
                 <a:spcPts val="600"/>
               </a:spcAft>
               <a:buFont typeface="Wingdings" panose="05000000000000000000" pitchFamily="2" charset="2"/>
-              <a:buChar char="q"/>
+              <a:buChar char="§"/>
             </a:pPr>
-            <a:endParaRPr lang="en-US" sz="2000" dirty="0"/>
+            <a:r>
+              <a:rPr lang="en-US" sz="2000" dirty="0">
+                <a:effectLst/>
+                <a:ea typeface="Calibri" panose="020F0502020204030204" pitchFamily="34" charset="0"/>
+                <a:cs typeface="Times New Roman" panose="02020603050405020304" pitchFamily="18" charset="0"/>
+              </a:rPr>
+              <a:t>Gliomas are the most prevalent type of adult brain tumor, accounting for 78 percent of malignant brain tumors. </a:t>
+            </a:r>
+          </a:p>
+          <a:p>
+            <a:pPr marL="0" indent="0">
+              <a:spcBef>
+                <a:spcPts val="0"/>
+              </a:spcBef>
+              <a:spcAft>
+                <a:spcPts val="600"/>
+              </a:spcAft>
+              <a:buNone/>
+            </a:pPr>
+            <a:endParaRPr lang="en-US" sz="2200" dirty="0">
+              <a:effectLst/>
+              <a:ea typeface="Calibri" panose="020F0502020204030204" pitchFamily="34" charset="0"/>
+              <a:cs typeface="Times New Roman" panose="02020603050405020304" pitchFamily="18" charset="0"/>
+            </a:endParaRPr>
+          </a:p>
+          <a:p>
+            <a:pPr marL="0" indent="0">
+              <a:spcBef>
+                <a:spcPts val="0"/>
+              </a:spcBef>
+              <a:spcAft>
+                <a:spcPts val="600"/>
+              </a:spcAft>
+              <a:buNone/>
+            </a:pPr>
+            <a:r>
+              <a:rPr lang="en-US" sz="2200" dirty="0">
+                <a:effectLst/>
+                <a:ea typeface="Calibri" panose="020F0502020204030204" pitchFamily="34" charset="0"/>
+                <a:cs typeface="Times New Roman" panose="02020603050405020304" pitchFamily="18" charset="0"/>
+              </a:rPr>
+              <a:t>Pituitary Tumor</a:t>
+            </a:r>
+            <a:r>
+              <a:rPr lang="en-US" sz="2200" dirty="0">
+                <a:ea typeface="Calibri" panose="020F0502020204030204" pitchFamily="34" charset="0"/>
+                <a:cs typeface="Times New Roman" panose="02020603050405020304" pitchFamily="18" charset="0"/>
+              </a:rPr>
+              <a:t>: </a:t>
+            </a:r>
+          </a:p>
+          <a:p>
+            <a:pPr>
+              <a:spcBef>
+                <a:spcPts val="0"/>
+              </a:spcBef>
+              <a:spcAft>
+                <a:spcPts val="600"/>
+              </a:spcAft>
+              <a:buFont typeface="Wingdings" panose="05000000000000000000" pitchFamily="2" charset="2"/>
+              <a:buChar char="§"/>
+            </a:pPr>
+            <a:r>
+              <a:rPr lang="en-US" sz="2000" dirty="0">
+                <a:effectLst/>
+                <a:ea typeface="Calibri" panose="020F0502020204030204" pitchFamily="34" charset="0"/>
+              </a:rPr>
+              <a:t>A pituitary tumor is an abnormal growth in our pituitary gland. It is located behind the back of the nose. </a:t>
+            </a:r>
+          </a:p>
+          <a:p>
+            <a:pPr>
+              <a:spcBef>
+                <a:spcPts val="0"/>
+              </a:spcBef>
+              <a:spcAft>
+                <a:spcPts val="600"/>
+              </a:spcAft>
+              <a:buFont typeface="Wingdings" panose="05000000000000000000" pitchFamily="2" charset="2"/>
+              <a:buChar char="§"/>
+            </a:pPr>
+            <a:r>
+              <a:rPr lang="en-US" sz="2000" dirty="0">
+                <a:effectLst/>
+                <a:ea typeface="Calibri" panose="020F0502020204030204" pitchFamily="34" charset="0"/>
+              </a:rPr>
+              <a:t>It makes hormones that affect many other glands and many functions in your body. </a:t>
+            </a:r>
+          </a:p>
+          <a:p>
+            <a:pPr>
+              <a:spcBef>
+                <a:spcPts val="0"/>
+              </a:spcBef>
+              <a:spcAft>
+                <a:spcPts val="600"/>
+              </a:spcAft>
+              <a:buFont typeface="Wingdings" panose="05000000000000000000" pitchFamily="2" charset="2"/>
+              <a:buChar char="§"/>
+            </a:pPr>
+            <a:r>
+              <a:rPr lang="en-US" sz="2000" dirty="0">
+                <a:effectLst/>
+                <a:ea typeface="Calibri" panose="020F0502020204030204" pitchFamily="34" charset="0"/>
+              </a:rPr>
+              <a:t>Most pituitary tumors are not cancerous (benign). </a:t>
+            </a:r>
           </a:p>
         </p:txBody>
       </p:sp>
@@ -16656,9 +16716,35 @@
         </p:spPr>
         <p:txBody>
           <a:bodyPr>
-            <a:normAutofit/>
+            <a:normAutofit fontScale="92500" lnSpcReduction="20000"/>
           </a:bodyPr>
           <a:lstStyle/>
+          <a:p>
+            <a:pPr marL="0" marR="0" indent="0">
+              <a:spcBef>
+                <a:spcPts val="0"/>
+              </a:spcBef>
+              <a:spcAft>
+                <a:spcPts val="600"/>
+              </a:spcAft>
+              <a:buNone/>
+            </a:pPr>
+            <a:r>
+              <a:rPr lang="en-US" sz="2200" dirty="0">
+                <a:effectLst/>
+                <a:ea typeface="Calibri" panose="020F0502020204030204" pitchFamily="34" charset="0"/>
+                <a:cs typeface="Times New Roman" panose="02020603050405020304" pitchFamily="18" charset="0"/>
+              </a:rPr>
+              <a:t>Meningioma Tumor</a:t>
+            </a:r>
+            <a:r>
+              <a:rPr lang="en-US" sz="2200" dirty="0">
+                <a:ea typeface="Calibri" panose="020F0502020204030204" pitchFamily="34" charset="0"/>
+                <a:cs typeface="Times New Roman" panose="02020603050405020304" pitchFamily="18" charset="0"/>
+              </a:rPr>
+              <a:t>: </a:t>
+            </a:r>
+          </a:p>
           <a:p>
             <a:pPr marR="0">
               <a:spcBef>
@@ -16668,33 +16754,57 @@
                 <a:spcPts val="600"/>
               </a:spcAft>
               <a:buFont typeface="Wingdings" panose="05000000000000000000" pitchFamily="2" charset="2"/>
-              <a:buChar char="q"/>
+              <a:buChar char="§"/>
             </a:pPr>
             <a:r>
-              <a:rPr lang="en-US" sz="2200" dirty="0">
-                <a:effectLst/>
-                <a:latin typeface="Arial" panose="020B0604020202020204" pitchFamily="34" charset="0"/>
+              <a:rPr lang="en-US" sz="2000" dirty="0">
                 <a:ea typeface="Calibri" panose="020F0502020204030204" pitchFamily="34" charset="0"/>
                 <a:cs typeface="Times New Roman" panose="02020603050405020304" pitchFamily="18" charset="0"/>
               </a:rPr>
-              <a:t> Meningioma Tumor</a:t>
-            </a:r>
-            <a:r>
-              <a:rPr lang="en-US" sz="2200" dirty="0">
-                <a:latin typeface="Calibri" panose="020F0502020204030204" pitchFamily="34" charset="0"/>
+              <a:t>Meningioma is the most common primary brain tumor, accounting for more than 30% of all brain tumors. </a:t>
+            </a:r>
+          </a:p>
+          <a:p>
+            <a:pPr marR="0">
+              <a:spcBef>
+                <a:spcPts val="0"/>
+              </a:spcBef>
+              <a:spcAft>
+                <a:spcPts val="600"/>
+              </a:spcAft>
+              <a:buFont typeface="Wingdings" panose="05000000000000000000" pitchFamily="2" charset="2"/>
+              <a:buChar char="§"/>
+            </a:pPr>
+            <a:r>
+              <a:rPr lang="en-US" sz="2000" dirty="0">
                 <a:ea typeface="Calibri" panose="020F0502020204030204" pitchFamily="34" charset="0"/>
                 <a:cs typeface="Times New Roman" panose="02020603050405020304" pitchFamily="18" charset="0"/>
               </a:rPr>
-              <a:t>: </a:t>
-            </a:r>
-            <a:r>
-              <a:rPr lang="en-US" sz="2200" dirty="0">
-                <a:effectLst/>
-                <a:latin typeface="Arial" panose="020B0604020202020204" pitchFamily="34" charset="0"/>
+              <a:t>Meningiomas originate in the meninges, the outer three layers of tissue that cover and protect the brain just under the skull. </a:t>
+            </a:r>
+          </a:p>
+          <a:p>
+            <a:pPr marR="0">
+              <a:spcBef>
+                <a:spcPts val="0"/>
+              </a:spcBef>
+              <a:spcAft>
+                <a:spcPts val="600"/>
+              </a:spcAft>
+              <a:buFont typeface="Wingdings" panose="05000000000000000000" pitchFamily="2" charset="2"/>
+              <a:buChar char="§"/>
+            </a:pPr>
+            <a:r>
+              <a:rPr lang="en-US" sz="2000" dirty="0">
                 <a:ea typeface="Calibri" panose="020F0502020204030204" pitchFamily="34" charset="0"/>
+                <a:cs typeface="Times New Roman" panose="02020603050405020304" pitchFamily="18" charset="0"/>
               </a:rPr>
-              <a:t>A meningioma is a tumor that arises from the meninges — the membranes that surround our brain and spinal cord. Meningioma is the most common type of tumor that forms in the head.</a:t>
-            </a:r>
+              <a:t>About 85% of meningiomas are noncancerous, slow-growing tumors. </a:t>
+            </a:r>
+            <a:endParaRPr lang="en-US" sz="2000" dirty="0">
+              <a:effectLst/>
+              <a:ea typeface="Calibri" panose="020F0502020204030204" pitchFamily="34" charset="0"/>
+            </a:endParaRPr>
           </a:p>
           <a:p>
             <a:pPr marL="0" marR="0" indent="0">
@@ -16708,9 +16818,32 @@
             </a:pPr>
             <a:endParaRPr lang="en-US" sz="2200" dirty="0">
               <a:effectLst/>
-              <a:latin typeface="Arial" panose="020B0604020202020204" pitchFamily="34" charset="0"/>
               <a:ea typeface="Calibri" panose="020F0502020204030204" pitchFamily="34" charset="0"/>
             </a:endParaRPr>
+          </a:p>
+          <a:p>
+            <a:pPr marL="0" marR="0" indent="0">
+              <a:spcBef>
+                <a:spcPts val="0"/>
+              </a:spcBef>
+              <a:spcAft>
+                <a:spcPts val="600"/>
+              </a:spcAft>
+              <a:buNone/>
+            </a:pPr>
+            <a:r>
+              <a:rPr lang="en-US" sz="2200" dirty="0">
+                <a:effectLst/>
+                <a:ea typeface="Calibri" panose="020F0502020204030204" pitchFamily="34" charset="0"/>
+              </a:rPr>
+              <a:t>No Tumor</a:t>
+            </a:r>
+            <a:r>
+              <a:rPr lang="en-US" sz="2200" dirty="0">
+                <a:ea typeface="Calibri" panose="020F0502020204030204" pitchFamily="34" charset="0"/>
+              </a:rPr>
+              <a:t>: </a:t>
+            </a:r>
           </a:p>
           <a:p>
             <a:pPr marR="0">
@@ -16721,49 +16854,26 @@
                 <a:spcPts val="600"/>
               </a:spcAft>
               <a:buFont typeface="Wingdings" panose="05000000000000000000" pitchFamily="2" charset="2"/>
-              <a:buChar char="q"/>
+              <a:buChar char="§"/>
             </a:pPr>
+            <a:r>
+              <a:rPr lang="en-US" sz="2000" dirty="0">
+                <a:effectLst/>
+                <a:ea typeface="Calibri" panose="020F0502020204030204" pitchFamily="34" charset="0"/>
+              </a:rPr>
+              <a:t>The MRI image does not contain any kinds of tumor cell</a:t>
+            </a:r>
             <a:r>
               <a:rPr lang="en-US" sz="2200" dirty="0">
                 <a:effectLst/>
-                <a:latin typeface="Arial" panose="020B0604020202020204" pitchFamily="34" charset="0"/>
                 <a:ea typeface="Calibri" panose="020F0502020204030204" pitchFamily="34" charset="0"/>
               </a:rPr>
-              <a:t> No Tumor</a:t>
-            </a:r>
-            <a:r>
-              <a:rPr lang="en-US" sz="2200" dirty="0">
-                <a:latin typeface="Times New Roman" panose="02020603050405020304" pitchFamily="18" charset="0"/>
-                <a:ea typeface="Calibri" panose="020F0502020204030204" pitchFamily="34" charset="0"/>
-              </a:rPr>
-              <a:t>: </a:t>
-            </a:r>
-            <a:r>
-              <a:rPr lang="en-US" sz="2200" dirty="0">
-                <a:effectLst/>
-                <a:latin typeface="Arial" panose="020B0604020202020204" pitchFamily="34" charset="0"/>
-                <a:ea typeface="Calibri" panose="020F0502020204030204" pitchFamily="34" charset="0"/>
-              </a:rPr>
-              <a:t>The MRI image does not contain any kinds of tumor cell.</a:t>
+              <a:t>.</a:t>
             </a:r>
             <a:endParaRPr lang="en-US" sz="2200" dirty="0">
               <a:effectLst/>
-              <a:latin typeface="Times New Roman" panose="02020603050405020304" pitchFamily="18" charset="0"/>
               <a:ea typeface="Times New Roman" panose="02020603050405020304" pitchFamily="18" charset="0"/>
             </a:endParaRPr>
-          </a:p>
-          <a:p>
-            <a:pPr marR="0">
-              <a:spcBef>
-                <a:spcPts val="0"/>
-              </a:spcBef>
-              <a:spcAft>
-                <a:spcPts val="600"/>
-              </a:spcAft>
-              <a:buFont typeface="Wingdings" panose="05000000000000000000" pitchFamily="2" charset="2"/>
-              <a:buChar char="q"/>
-            </a:pPr>
-            <a:endParaRPr lang="en-US" sz="2200" dirty="0"/>
           </a:p>
         </p:txBody>
       </p:sp>
@@ -17511,7 +17621,6 @@
             <a:r>
               <a:rPr lang="en-US" sz="5400" dirty="0">
                 <a:effectLst/>
-                <a:latin typeface="Arial" panose="020B0604020202020204" pitchFamily="34" charset="0"/>
                 <a:ea typeface="Times New Roman" panose="02020603050405020304" pitchFamily="18" charset="0"/>
               </a:rPr>
               <a:t>Data Wrangling</a:t>
@@ -18071,7 +18180,6 @@
             <a:r>
               <a:rPr lang="en-US" sz="4100" dirty="0">
                 <a:effectLst/>
-                <a:latin typeface="Arial" panose="020B0604020202020204" pitchFamily="34" charset="0"/>
                 <a:ea typeface="Times New Roman" panose="02020603050405020304" pitchFamily="18" charset="0"/>
               </a:rPr>
               <a:t>Exploratory Data Analysis Step one</a:t>

</xml_diff>